<commit_message>
Slides for Jan 9
</commit_message>
<xml_diff>
--- a/Slides/010417.pptx
+++ b/Slides/010417.pptx
@@ -734,7 +734,7 @@
               <ma14:placeholderFlag xmlns:ma14="http://schemas.microsoft.com/office/mac/drawingml/2011/main" val="1"/>
             </a:ext>
             <a:ext uri="{909E8E84-426E-40dd-AFC4-6F175D3DCCD1}">
-              <a14:hiddenFill xmlns="" xmlns:a14="http://schemas.microsoft.com/office/drawing/2010/main">
+              <a14:hiddenFill xmlns:a14="http://schemas.microsoft.com/office/drawing/2010/main" xmlns="">
                 <a:solidFill>
                   <a:srgbClr val="FFFFFF"/>
                 </a:solidFill>
@@ -909,14 +909,14 @@
           <a:ln/>
           <a:extLst>
             <a:ext uri="{909E8E84-426E-40dd-AFC4-6F175D3DCCD1}">
-              <a14:hiddenFill xmlns="" xmlns:a14="http://schemas.microsoft.com/office/drawing/2010/main">
+              <a14:hiddenFill xmlns:a14="http://schemas.microsoft.com/office/drawing/2010/main" xmlns="">
                 <a:solidFill>
                   <a:srgbClr val="FFFFFF"/>
                 </a:solidFill>
               </a14:hiddenFill>
             </a:ext>
             <a:ext uri="{91240B29-F687-4f45-9708-019B960494DF}">
-              <a14:hiddenLine xmlns="" xmlns:a14="http://schemas.microsoft.com/office/drawing/2010/main" w="9525">
+              <a14:hiddenLine xmlns:a14="http://schemas.microsoft.com/office/drawing/2010/main" xmlns="" w="9525">
                 <a:solidFill>
                   <a:srgbClr val="000000"/>
                 </a:solidFill>
@@ -1087,14 +1087,14 @@
               <ma14:placeholderFlag xmlns:ma14="http://schemas.microsoft.com/office/mac/drawingml/2011/main" val="1"/>
             </a:ext>
             <a:ext uri="{909E8E84-426E-40dd-AFC4-6F175D3DCCD1}">
-              <a14:hiddenFill xmlns="" xmlns:a14="http://schemas.microsoft.com/office/drawing/2010/main">
+              <a14:hiddenFill xmlns:a14="http://schemas.microsoft.com/office/drawing/2010/main" xmlns="">
                 <a:solidFill>
                   <a:srgbClr val="FFFFFF"/>
                 </a:solidFill>
               </a14:hiddenFill>
             </a:ext>
             <a:ext uri="{91240B29-F687-4f45-9708-019B960494DF}">
-              <a14:hiddenLine xmlns="" xmlns:a14="http://schemas.microsoft.com/office/drawing/2010/main" w="9525">
+              <a14:hiddenLine xmlns:a14="http://schemas.microsoft.com/office/drawing/2010/main" xmlns="" w="9525">
                 <a:solidFill>
                   <a:srgbClr val="000000"/>
                 </a:solidFill>
@@ -5049,14 +5049,14 @@
               <ma14:placeholderFlag xmlns:ma14="http://schemas.microsoft.com/office/mac/drawingml/2011/main" val="1"/>
             </a:ext>
             <a:ext uri="{909E8E84-426E-40dd-AFC4-6F175D3DCCD1}">
-              <a14:hiddenFill xmlns="" xmlns:a14="http://schemas.microsoft.com/office/drawing/2010/main">
+              <a14:hiddenFill xmlns:a14="http://schemas.microsoft.com/office/drawing/2010/main" xmlns="">
                 <a:solidFill>
                   <a:srgbClr val="FFFFFF"/>
                 </a:solidFill>
               </a14:hiddenFill>
             </a:ext>
             <a:ext uri="{91240B29-F687-4f45-9708-019B960494DF}">
-              <a14:hiddenLine xmlns="" xmlns:a14="http://schemas.microsoft.com/office/drawing/2010/main" w="9525">
+              <a14:hiddenLine xmlns:a14="http://schemas.microsoft.com/office/drawing/2010/main" xmlns="" w="9525">
                 <a:solidFill>
                   <a:srgbClr val="000000"/>
                 </a:solidFill>

</xml_diff>